<commit_message>
Update presentation with small fixes
</commit_message>
<xml_diff>
--- a/presentation/FGV-MBA - Aplicações Estatística Espacial - Pré-Projeto - Grupo 2.pptx
+++ b/presentation/FGV-MBA - Aplicações Estatística Espacial - Pré-Projeto - Grupo 2.pptx
@@ -8310,7 +8310,7 @@
             <a:fld id="{B26FF4F9-2FBB-4F7A-9697-05FA74F11F3B}" type="datetimeFigureOut">
               <a:rPr lang="pt-BR" smtClean="0"/>
               <a:pPr/>
-              <a:t>02/06/2020</a:t>
+              <a:t>11/06/2020</a:t>
             </a:fld>
             <a:endParaRPr lang="pt-BR"/>
           </a:p>
@@ -8489,7 +8489,7 @@
             <a:fld id="{1820D135-1270-41BD-8A14-B5B3DA62A4B5}" type="datetimeFigureOut">
               <a:rPr lang="pt-BR" smtClean="0"/>
               <a:pPr/>
-              <a:t>02/06/2020</a:t>
+              <a:t>11/06/2020</a:t>
             </a:fld>
             <a:endParaRPr lang="pt-BR"/>
           </a:p>
@@ -14552,6 +14552,36 @@
           <a:chExt cx="0" cy="0"/>
         </a:xfrm>
       </p:grpSpPr>
+      <p:pic>
+        <p:nvPicPr>
+          <p:cNvPr id="6" name="Picture 5">
+            <a:extLst>
+              <a:ext uri="{FF2B5EF4-FFF2-40B4-BE49-F238E27FC236}">
+                <a16:creationId xmlns:a16="http://schemas.microsoft.com/office/drawing/2014/main" id="{806223E6-CF0D-4AD2-9536-3F012144A9D6}"/>
+              </a:ext>
+            </a:extLst>
+          </p:cNvPr>
+          <p:cNvPicPr>
+            <a:picLocks noChangeAspect="1"/>
+          </p:cNvPicPr>
+          <p:nvPr/>
+        </p:nvPicPr>
+        <p:blipFill>
+          <a:blip r:embed="rId2"/>
+          <a:stretch>
+            <a:fillRect/>
+          </a:stretch>
+        </p:blipFill>
+        <p:spPr>
+          <a:xfrm>
+            <a:off x="5524789" y="4988093"/>
+            <a:ext cx="3391189" cy="1785103"/>
+          </a:xfrm>
+          <a:prstGeom prst="rect">
+            <a:avLst/>
+          </a:prstGeom>
+        </p:spPr>
+      </p:pic>
       <p:sp>
         <p:nvSpPr>
           <p:cNvPr id="2" name="CaixaDeTexto 1">
@@ -14728,7 +14758,7 @@
           <p:nvPr/>
         </p:nvPicPr>
         <p:blipFill>
-          <a:blip r:embed="rId2" cstate="hqprint">
+          <a:blip r:embed="rId3" cstate="hqprint">
             <a:extLst>
               <a:ext uri="{28A0092B-C50C-407E-A947-70E740481C1C}">
                 <a14:useLocalDpi xmlns:a14="http://schemas.microsoft.com/office/drawing/2010/main" val="0"/>
@@ -14742,7 +14772,7 @@
         </p:blipFill>
         <p:spPr bwMode="auto">
           <a:xfrm>
-            <a:off x="160860" y="4495584"/>
+            <a:off x="3685591" y="5356015"/>
             <a:ext cx="1161808" cy="1049258"/>
           </a:xfrm>
           <a:prstGeom prst="rect">
@@ -14769,7 +14799,7 @@
           <p:nvPr/>
         </p:nvPicPr>
         <p:blipFill>
-          <a:blip r:embed="rId3" cstate="hqprint">
+          <a:blip r:embed="rId4" cstate="hqprint">
             <a:extLst>
               <a:ext uri="{28A0092B-C50C-407E-A947-70E740481C1C}">
                 <a14:useLocalDpi xmlns:a14="http://schemas.microsoft.com/office/drawing/2010/main" val="0"/>
@@ -14783,7 +14813,7 @@
         </p:blipFill>
         <p:spPr bwMode="auto">
           <a:xfrm>
-            <a:off x="3585118" y="4526063"/>
+            <a:off x="803102" y="3999792"/>
             <a:ext cx="1275454" cy="988301"/>
           </a:xfrm>
           <a:prstGeom prst="rect">
@@ -14810,7 +14840,7 @@
           <p:nvPr/>
         </p:nvPicPr>
         <p:blipFill>
-          <a:blip r:embed="rId4">
+          <a:blip r:embed="rId5">
             <a:extLst>
               <a:ext uri="{28A0092B-C50C-407E-A947-70E740481C1C}">
                 <a14:useLocalDpi xmlns:a14="http://schemas.microsoft.com/office/drawing/2010/main" val="0"/>
@@ -14824,7 +14854,7 @@
         </p:blipFill>
         <p:spPr bwMode="auto">
           <a:xfrm>
-            <a:off x="9302665" y="4559975"/>
+            <a:off x="8520488" y="4033704"/>
             <a:ext cx="2714664" cy="920476"/>
           </a:xfrm>
           <a:prstGeom prst="rect">
@@ -14857,7 +14887,7 @@
           <p:nvPr/>
         </p:nvPicPr>
         <p:blipFill rotWithShape="1">
-          <a:blip r:embed="rId5">
+          <a:blip r:embed="rId6">
             <a:extLst>
               <a:ext uri="{28A0092B-C50C-407E-A947-70E740481C1C}">
                 <a14:useLocalDpi xmlns:a14="http://schemas.microsoft.com/office/drawing/2010/main" val="0"/>
@@ -14869,7 +14899,7 @@
         </p:blipFill>
         <p:spPr bwMode="auto">
           <a:xfrm>
-            <a:off x="5074255" y="4525399"/>
+            <a:off x="2958851" y="3999128"/>
             <a:ext cx="2711770" cy="989628"/>
           </a:xfrm>
           <a:prstGeom prst="rect">
@@ -14902,7 +14932,7 @@
           <p:nvPr/>
         </p:nvPicPr>
         <p:blipFill>
-          <a:blip r:embed="rId6">
+          <a:blip r:embed="rId7">
             <a:extLst>
               <a:ext uri="{28A0092B-C50C-407E-A947-70E740481C1C}">
                 <a14:useLocalDpi xmlns:a14="http://schemas.microsoft.com/office/drawing/2010/main" val="0"/>
@@ -14916,7 +14946,7 @@
         </p:blipFill>
         <p:spPr bwMode="auto">
           <a:xfrm>
-            <a:off x="7999708" y="4475575"/>
+            <a:off x="6550916" y="3949304"/>
             <a:ext cx="1089276" cy="1089276"/>
           </a:xfrm>
           <a:prstGeom prst="rect">
@@ -14932,36 +14962,6 @@
               </a14:hiddenFill>
             </a:ext>
           </a:extLst>
-        </p:spPr>
-      </p:pic>
-      <p:pic>
-        <p:nvPicPr>
-          <p:cNvPr id="6" name="Picture 5">
-            <a:extLst>
-              <a:ext uri="{FF2B5EF4-FFF2-40B4-BE49-F238E27FC236}">
-                <a16:creationId xmlns:a16="http://schemas.microsoft.com/office/drawing/2014/main" id="{806223E6-CF0D-4AD2-9536-3F012144A9D6}"/>
-              </a:ext>
-            </a:extLst>
-          </p:cNvPr>
-          <p:cNvPicPr>
-            <a:picLocks noChangeAspect="1"/>
-          </p:cNvPicPr>
-          <p:nvPr/>
-        </p:nvPicPr>
-        <p:blipFill>
-          <a:blip r:embed="rId7"/>
-          <a:stretch>
-            <a:fillRect/>
-          </a:stretch>
-        </p:blipFill>
-        <p:spPr>
-          <a:xfrm>
-            <a:off x="1536351" y="4537224"/>
-            <a:ext cx="1835084" cy="965978"/>
-          </a:xfrm>
-          <a:prstGeom prst="rect">
-            <a:avLst/>
-          </a:prstGeom>
         </p:spPr>
       </p:pic>
     </p:spTree>

</xml_diff>